<commit_message>
Added function to show the results of a mesh density scan for initial model settings validation.
</commit_message>
<xml_diff>
--- a/Documentation/Validation workflow.pptx
+++ b/Documentation/Validation workflow.pptx
@@ -104,6 +104,11 @@
       </a:defRPr>
     </a:lvl9pPr>
   </p:defaultTextStyle>
+  <p:extLst>
+    <p:ext uri="{EFAFB233-063F-42B5-8137-9DF3F51BA10A}">
+      <p15:sldGuideLst xmlns:p15="http://schemas.microsoft.com/office/powerpoint/2012/main"/>
+    </p:ext>
+  </p:extLst>
 </p:presentation>
 </file>
 
@@ -238,7 +243,7 @@
           <a:p>
             <a:fld id="{22E35962-1FAB-479B-92E2-74AC4704C16C}" type="datetimeFigureOut">
               <a:rPr lang="en-GB" smtClean="0"/>
-              <a:t>15/08/2019</a:t>
+              <a:t>16/08/2019</a:t>
             </a:fld>
             <a:endParaRPr lang="en-GB"/>
           </a:p>
@@ -408,7 +413,7 @@
           <a:p>
             <a:fld id="{22E35962-1FAB-479B-92E2-74AC4704C16C}" type="datetimeFigureOut">
               <a:rPr lang="en-GB" smtClean="0"/>
-              <a:t>15/08/2019</a:t>
+              <a:t>16/08/2019</a:t>
             </a:fld>
             <a:endParaRPr lang="en-GB"/>
           </a:p>
@@ -588,7 +593,7 @@
           <a:p>
             <a:fld id="{22E35962-1FAB-479B-92E2-74AC4704C16C}" type="datetimeFigureOut">
               <a:rPr lang="en-GB" smtClean="0"/>
-              <a:t>15/08/2019</a:t>
+              <a:t>16/08/2019</a:t>
             </a:fld>
             <a:endParaRPr lang="en-GB"/>
           </a:p>
@@ -758,7 +763,7 @@
           <a:p>
             <a:fld id="{22E35962-1FAB-479B-92E2-74AC4704C16C}" type="datetimeFigureOut">
               <a:rPr lang="en-GB" smtClean="0"/>
-              <a:t>15/08/2019</a:t>
+              <a:t>16/08/2019</a:t>
             </a:fld>
             <a:endParaRPr lang="en-GB"/>
           </a:p>
@@ -1002,7 +1007,7 @@
           <a:p>
             <a:fld id="{22E35962-1FAB-479B-92E2-74AC4704C16C}" type="datetimeFigureOut">
               <a:rPr lang="en-GB" smtClean="0"/>
-              <a:t>15/08/2019</a:t>
+              <a:t>16/08/2019</a:t>
             </a:fld>
             <a:endParaRPr lang="en-GB"/>
           </a:p>
@@ -1234,7 +1239,7 @@
           <a:p>
             <a:fld id="{22E35962-1FAB-479B-92E2-74AC4704C16C}" type="datetimeFigureOut">
               <a:rPr lang="en-GB" smtClean="0"/>
-              <a:t>15/08/2019</a:t>
+              <a:t>16/08/2019</a:t>
             </a:fld>
             <a:endParaRPr lang="en-GB"/>
           </a:p>
@@ -1601,7 +1606,7 @@
           <a:p>
             <a:fld id="{22E35962-1FAB-479B-92E2-74AC4704C16C}" type="datetimeFigureOut">
               <a:rPr lang="en-GB" smtClean="0"/>
-              <a:t>15/08/2019</a:t>
+              <a:t>16/08/2019</a:t>
             </a:fld>
             <a:endParaRPr lang="en-GB"/>
           </a:p>
@@ -1719,7 +1724,7 @@
           <a:p>
             <a:fld id="{22E35962-1FAB-479B-92E2-74AC4704C16C}" type="datetimeFigureOut">
               <a:rPr lang="en-GB" smtClean="0"/>
-              <a:t>15/08/2019</a:t>
+              <a:t>16/08/2019</a:t>
             </a:fld>
             <a:endParaRPr lang="en-GB"/>
           </a:p>
@@ -1814,7 +1819,7 @@
           <a:p>
             <a:fld id="{22E35962-1FAB-479B-92E2-74AC4704C16C}" type="datetimeFigureOut">
               <a:rPr lang="en-GB" smtClean="0"/>
-              <a:t>15/08/2019</a:t>
+              <a:t>16/08/2019</a:t>
             </a:fld>
             <a:endParaRPr lang="en-GB"/>
           </a:p>
@@ -2091,7 +2096,7 @@
           <a:p>
             <a:fld id="{22E35962-1FAB-479B-92E2-74AC4704C16C}" type="datetimeFigureOut">
               <a:rPr lang="en-GB" smtClean="0"/>
-              <a:t>15/08/2019</a:t>
+              <a:t>16/08/2019</a:t>
             </a:fld>
             <a:endParaRPr lang="en-GB"/>
           </a:p>
@@ -2348,7 +2353,7 @@
           <a:p>
             <a:fld id="{22E35962-1FAB-479B-92E2-74AC4704C16C}" type="datetimeFigureOut">
               <a:rPr lang="en-GB" smtClean="0"/>
-              <a:t>15/08/2019</a:t>
+              <a:t>16/08/2019</a:t>
             </a:fld>
             <a:endParaRPr lang="en-GB"/>
           </a:p>
@@ -2561,7 +2566,7 @@
           <a:p>
             <a:fld id="{22E35962-1FAB-479B-92E2-74AC4704C16C}" type="datetimeFigureOut">
               <a:rPr lang="en-GB" smtClean="0"/>
-              <a:t>15/08/2019</a:t>
+              <a:t>16/08/2019</a:t>
             </a:fld>
             <a:endParaRPr lang="en-GB"/>
           </a:p>
@@ -3106,8 +3111,8 @@
         </p:nvSpPr>
         <p:spPr>
           <a:xfrm>
-            <a:off x="1653374" y="1588055"/>
-            <a:ext cx="3551252" cy="800672"/>
+            <a:off x="1653374" y="1630095"/>
+            <a:ext cx="3551252" cy="649464"/>
           </a:xfrm>
           <a:prstGeom prst="roundRect">
             <a:avLst/>
@@ -3170,22 +3175,6 @@
               </a:solidFill>
             </a:endParaRPr>
           </a:p>
-          <a:p>
-            <a:pPr algn="ctr"/>
-            <a:r>
-              <a:rPr lang="en-GB" sz="1600" dirty="0" err="1">
-                <a:solidFill>
-                  <a:srgbClr val="FF0000"/>
-                </a:solidFill>
-              </a:rPr>
-              <a:t>plot_wlf_vs.m</a:t>
-            </a:r>
-            <a:endParaRPr lang="en-GB" sz="1600" dirty="0">
-              <a:solidFill>
-                <a:srgbClr val="FF0000"/>
-              </a:solidFill>
-            </a:endParaRPr>
-          </a:p>
         </p:txBody>
       </p:sp>
       <p:sp>
@@ -3202,7 +3191,7 @@
         </p:nvSpPr>
         <p:spPr>
           <a:xfrm>
-            <a:off x="175533" y="2507057"/>
+            <a:off x="175533" y="2443997"/>
             <a:ext cx="6506934" cy="584324"/>
           </a:xfrm>
           <a:prstGeom prst="roundRect">
@@ -3267,7 +3256,7 @@
         <p:spPr>
           <a:xfrm>
             <a:off x="1498150" y="4510395"/>
-            <a:ext cx="3495463" cy="1140416"/>
+            <a:ext cx="3495463" cy="900815"/>
           </a:xfrm>
           <a:prstGeom prst="roundRect">
             <a:avLst/>
@@ -3322,7 +3311,7 @@
                   <a:schemeClr val="tx1"/>
                 </a:solidFill>
               </a:rPr>
-              <a:t>Plot wake loss factor vs wake length</a:t>
+              <a:t>Plot decay level vs wake length</a:t>
             </a:r>
           </a:p>
           <a:p>
@@ -3333,23 +3322,7 @@
                   <a:srgbClr val="FF0000"/>
                 </a:solidFill>
               </a:rPr>
-              <a:t>get_wlf_vs_wake_length.m</a:t>
-            </a:r>
-            <a:endParaRPr lang="en-GB" sz="1600" dirty="0">
-              <a:solidFill>
-                <a:srgbClr val="FF0000"/>
-              </a:solidFill>
-            </a:endParaRPr>
-          </a:p>
-          <a:p>
-            <a:pPr algn="ctr"/>
-            <a:r>
-              <a:rPr lang="en-GB" sz="1600" dirty="0" err="1">
-                <a:solidFill>
-                  <a:srgbClr val="FF0000"/>
-                </a:solidFill>
-              </a:rPr>
-              <a:t>plot_wlf_vs.m</a:t>
+              <a:t>get_decay_level_vs_wake_length.m</a:t>
             </a:r>
             <a:endParaRPr lang="en-GB" sz="1600" dirty="0">
               <a:solidFill>
@@ -3373,7 +3346,7 @@
         </p:nvSpPr>
         <p:spPr>
           <a:xfrm>
-            <a:off x="175533" y="3237431"/>
+            <a:off x="175533" y="3205901"/>
             <a:ext cx="6506934" cy="597215"/>
           </a:xfrm>
           <a:prstGeom prst="roundRect">
@@ -3640,7 +3613,7 @@
         </p:nvSpPr>
         <p:spPr>
           <a:xfrm>
-            <a:off x="760794" y="7059220"/>
+            <a:off x="844876" y="7059220"/>
             <a:ext cx="5336409" cy="316494"/>
           </a:xfrm>
           <a:prstGeom prst="roundRect">
@@ -3774,8 +3747,8 @@
         </p:nvSpPr>
         <p:spPr>
           <a:xfrm rot="5400000" flipH="1">
-            <a:off x="4592985" y="5423303"/>
-            <a:ext cx="1836684" cy="896073"/>
+            <a:off x="4792681" y="5223607"/>
+            <a:ext cx="1437292" cy="896073"/>
           </a:xfrm>
           <a:prstGeom prst="uturnArrow">
             <a:avLst>
@@ -3844,58 +3817,6 @@
       </p:sp>
       <p:sp>
         <p:nvSpPr>
-          <p:cNvPr id="22" name="Rectangle 21">
-            <a:extLst>
-              <a:ext uri="{FF2B5EF4-FFF2-40B4-BE49-F238E27FC236}">
-                <a16:creationId xmlns:a16="http://schemas.microsoft.com/office/drawing/2014/main" id="{96C56A7E-04FB-452F-87C2-ECA56C1B3683}"/>
-              </a:ext>
-            </a:extLst>
-          </p:cNvPr>
-          <p:cNvSpPr/>
-          <p:nvPr/>
-        </p:nvSpPr>
-        <p:spPr>
-          <a:xfrm>
-            <a:off x="4993613" y="5917322"/>
-            <a:ext cx="265047" cy="332572"/>
-          </a:xfrm>
-          <a:prstGeom prst="rect">
-            <a:avLst/>
-          </a:prstGeom>
-          <a:solidFill>
-            <a:schemeClr val="bg1"/>
-          </a:solidFill>
-          <a:ln w="28575">
-            <a:noFill/>
-          </a:ln>
-        </p:spPr>
-        <p:style>
-          <a:lnRef idx="2">
-            <a:schemeClr val="accent1">
-              <a:shade val="50000"/>
-            </a:schemeClr>
-          </a:lnRef>
-          <a:fillRef idx="1">
-            <a:schemeClr val="accent1"/>
-          </a:fillRef>
-          <a:effectRef idx="0">
-            <a:schemeClr val="accent1"/>
-          </a:effectRef>
-          <a:fontRef idx="minor">
-            <a:schemeClr val="lt1"/>
-          </a:fontRef>
-        </p:style>
-        <p:txBody>
-          <a:bodyPr rtlCol="0" anchor="ctr"/>
-          <a:lstStyle/>
-          <a:p>
-            <a:pPr algn="ctr"/>
-            <a:endParaRPr lang="en-GB"/>
-          </a:p>
-        </p:txBody>
-      </p:sp>
-      <p:sp>
-        <p:nvSpPr>
           <p:cNvPr id="15" name="Rectangle: Rounded Corners 14">
             <a:extLst>
               <a:ext uri="{FF2B5EF4-FFF2-40B4-BE49-F238E27FC236}">
@@ -3908,8 +3829,8 @@
         </p:nvSpPr>
         <p:spPr>
           <a:xfrm>
-            <a:off x="1107412" y="6447623"/>
-            <a:ext cx="3886201" cy="460974"/>
+            <a:off x="3142593" y="5642978"/>
+            <a:ext cx="1851020" cy="1213069"/>
           </a:xfrm>
           <a:prstGeom prst="roundRect">
             <a:avLst/>
@@ -3975,8 +3896,8 @@
         </p:nvSpPr>
         <p:spPr>
           <a:xfrm>
-            <a:off x="771624" y="5745932"/>
-            <a:ext cx="4822822" cy="582776"/>
+            <a:off x="855704" y="5609302"/>
+            <a:ext cx="2034638" cy="1299138"/>
           </a:xfrm>
           <a:prstGeom prst="roundRect">
             <a:avLst/>
@@ -4020,7 +3941,7 @@
                   <a:schemeClr val="tx1"/>
                 </a:solidFill>
               </a:rPr>
-              <a:t>Pick the wake length where increasing further does not influence the wake loss factor.</a:t>
+              <a:t>Pick the wake length where the wake potential has decayed sufficiently.</a:t>
             </a:r>
           </a:p>
         </p:txBody>
@@ -4039,8 +3960,8 @@
         </p:nvSpPr>
         <p:spPr>
           <a:xfrm rot="16200000" flipH="1">
-            <a:off x="-349406" y="6326145"/>
-            <a:ext cx="1512223" cy="602610"/>
+            <a:off x="-191593" y="6441919"/>
+            <a:ext cx="1280677" cy="602610"/>
           </a:xfrm>
           <a:prstGeom prst="uturnArrow">
             <a:avLst>
@@ -4107,6 +4028,50 @@
           </a:p>
         </p:txBody>
       </p:sp>
+      <p:cxnSp>
+        <p:nvCxnSpPr>
+          <p:cNvPr id="3" name="Straight Connector 2">
+            <a:extLst>
+              <a:ext uri="{FF2B5EF4-FFF2-40B4-BE49-F238E27FC236}">
+                <a16:creationId xmlns:a16="http://schemas.microsoft.com/office/drawing/2014/main" id="{265ACF41-9E4E-47CB-B039-15DC2C3B50FD}"/>
+              </a:ext>
+            </a:extLst>
+          </p:cNvPr>
+          <p:cNvCxnSpPr/>
+          <p:nvPr/>
+        </p:nvCxnSpPr>
+        <p:spPr>
+          <a:xfrm>
+            <a:off x="3016469" y="5609302"/>
+            <a:ext cx="0" cy="1299138"/>
+          </a:xfrm>
+          <a:prstGeom prst="line">
+            <a:avLst/>
+          </a:prstGeom>
+          <a:ln w="22225">
+            <a:solidFill>
+              <a:schemeClr val="bg1">
+                <a:lumMod val="75000"/>
+              </a:schemeClr>
+            </a:solidFill>
+            <a:prstDash val="sysDash"/>
+          </a:ln>
+        </p:spPr>
+        <p:style>
+          <a:lnRef idx="1">
+            <a:schemeClr val="accent1"/>
+          </a:lnRef>
+          <a:fillRef idx="0">
+            <a:schemeClr val="accent1"/>
+          </a:fillRef>
+          <a:effectRef idx="0">
+            <a:schemeClr val="accent1"/>
+          </a:effectRef>
+          <a:fontRef idx="minor">
+            <a:schemeClr val="tx1"/>
+          </a:fontRef>
+        </p:style>
+      </p:cxnSp>
     </p:spTree>
     <p:extLst>
       <p:ext uri="{BB962C8B-B14F-4D97-AF65-F5344CB8AC3E}">

</xml_diff>